<commit_message>
Seminar ppt update reference
</commit_message>
<xml_diff>
--- a/Seminar PPT.pptx
+++ b/Seminar PPT.pptx
@@ -2412,7 +2412,7 @@
         <p:spPr>
           <a:xfrm>
             <a:off x="780585" y="936702"/>
-            <a:ext cx="12277493" cy="923330"/>
+            <a:ext cx="12277493" cy="1477328"/>
           </a:xfrm>
           <a:prstGeom prst="rect">
             <a:avLst/>
@@ -2447,6 +2447,26 @@
                 <a:hlinkClick r:id="rId2"/>
               </a:rPr>
               <a:t>https://link.springer.com/article/10.1007/s42452-020-04058-2</a:t>
+            </a:r>
+            <a:endParaRPr lang="en-IN" dirty="0">
+              <a:latin typeface="Times New Roman" panose="02020603050405020304" pitchFamily="18" charset="0"/>
+              <a:cs typeface="Times New Roman" panose="02020603050405020304" pitchFamily="18" charset="0"/>
+            </a:endParaRPr>
+          </a:p>
+          <a:p>
+            <a:endParaRPr lang="en-IN" dirty="0">
+              <a:latin typeface="Times New Roman" panose="02020603050405020304" pitchFamily="18" charset="0"/>
+              <a:cs typeface="Times New Roman" panose="02020603050405020304" pitchFamily="18" charset="0"/>
+            </a:endParaRPr>
+          </a:p>
+          <a:p>
+            <a:r>
+              <a:rPr lang="en-IN">
+                <a:latin typeface="Times New Roman" panose="02020603050405020304" pitchFamily="18" charset="0"/>
+                <a:cs typeface="Times New Roman" panose="02020603050405020304" pitchFamily="18" charset="0"/>
+                <a:hlinkClick r:id="rId3"/>
+              </a:rPr>
+              <a:t>https://standards.ieee.org/ieee/802.15.6/5364/</a:t>
             </a:r>
             <a:endParaRPr lang="en-IN" dirty="0">
               <a:latin typeface="Times New Roman" panose="02020603050405020304" pitchFamily="18" charset="0"/>

</xml_diff>